<commit_message>
Documentation and some refactoring
</commit_message>
<xml_diff>
--- a/doc/programming_project_slides.pptx
+++ b/doc/programming_project_slides.pptx
@@ -388,7 +388,7 @@
           <a:p>
             <a:fld id="{96DFF08F-DC6B-4601-B491-B0F83F6DD2DA}" type="datetimeFigureOut">
               <a:rPr lang="en-US" smtClean="0"/>
-              <a:t>7/11/2016</a:t>
+              <a:t>7/14/2016</a:t>
             </a:fld>
             <a:endParaRPr lang="en-US" dirty="0"/>
           </a:p>
@@ -596,7 +596,7 @@
           <a:p>
             <a:fld id="{96DFF08F-DC6B-4601-B491-B0F83F6DD2DA}" type="datetimeFigureOut">
               <a:rPr lang="en-US" smtClean="0"/>
-              <a:t>7/11/2016</a:t>
+              <a:t>7/14/2016</a:t>
             </a:fld>
             <a:endParaRPr lang="en-US" dirty="0"/>
           </a:p>
@@ -852,7 +852,7 @@
           <a:p>
             <a:fld id="{96DFF08F-DC6B-4601-B491-B0F83F6DD2DA}" type="datetimeFigureOut">
               <a:rPr lang="en-US" smtClean="0"/>
-              <a:t>7/11/2016</a:t>
+              <a:t>7/14/2016</a:t>
             </a:fld>
             <a:endParaRPr lang="en-US" dirty="0"/>
           </a:p>
@@ -1022,7 +1022,7 @@
           <a:p>
             <a:fld id="{D62CEF3B-A037-46D0-B02C-1428F07E9383}" type="datetimeFigureOut">
               <a:rPr lang="en-US" smtClean="0"/>
-              <a:t>7/11/2016</a:t>
+              <a:t>7/14/2016</a:t>
             </a:fld>
             <a:endParaRPr lang="en-US" dirty="0"/>
           </a:p>
@@ -1365,7 +1365,7 @@
           <a:p>
             <a:fld id="{96DFF08F-DC6B-4601-B491-B0F83F6DD2DA}" type="datetimeFigureOut">
               <a:rPr lang="en-US" smtClean="0"/>
-              <a:t>7/11/2016</a:t>
+              <a:t>7/14/2016</a:t>
             </a:fld>
             <a:endParaRPr lang="en-US" dirty="0"/>
           </a:p>
@@ -1640,7 +1640,7 @@
           <a:p>
             <a:fld id="{96DFF08F-DC6B-4601-B491-B0F83F6DD2DA}" type="datetimeFigureOut">
               <a:rPr lang="en-US" smtClean="0"/>
-              <a:t>7/11/2016</a:t>
+              <a:t>7/14/2016</a:t>
             </a:fld>
             <a:endParaRPr lang="en-US" dirty="0"/>
           </a:p>
@@ -2019,7 +2019,7 @@
           <a:p>
             <a:fld id="{96DFF08F-DC6B-4601-B491-B0F83F6DD2DA}" type="datetimeFigureOut">
               <a:rPr lang="en-US" smtClean="0"/>
-              <a:t>7/11/2016</a:t>
+              <a:t>7/14/2016</a:t>
             </a:fld>
             <a:endParaRPr lang="en-US" dirty="0"/>
           </a:p>
@@ -2137,7 +2137,7 @@
           <a:p>
             <a:fld id="{96DFF08F-DC6B-4601-B491-B0F83F6DD2DA}" type="datetimeFigureOut">
               <a:rPr lang="en-US" smtClean="0"/>
-              <a:t>7/11/2016</a:t>
+              <a:t>7/14/2016</a:t>
             </a:fld>
             <a:endParaRPr lang="en-US" dirty="0"/>
           </a:p>
@@ -2309,7 +2309,7 @@
             <a:fld id="{96DFF08F-DC6B-4601-B491-B0F83F6DD2DA}" type="datetimeFigureOut">
               <a:rPr lang="en-US" smtClean="0"/>
               <a:pPr/>
-              <a:t>7/11/2016</a:t>
+              <a:t>7/14/2016</a:t>
             </a:fld>
             <a:endParaRPr lang="en-US" dirty="0"/>
           </a:p>
@@ -2665,7 +2665,7 @@
             <a:fld id="{96DFF08F-DC6B-4601-B491-B0F83F6DD2DA}" type="datetimeFigureOut">
               <a:rPr lang="en-US" smtClean="0"/>
               <a:pPr/>
-              <a:t>7/11/2016</a:t>
+              <a:t>7/14/2016</a:t>
             </a:fld>
             <a:endParaRPr lang="en-US" dirty="0"/>
           </a:p>
@@ -3043,7 +3043,7 @@
           <a:p>
             <a:fld id="{96DFF08F-DC6B-4601-B491-B0F83F6DD2DA}" type="datetimeFigureOut">
               <a:rPr lang="en-US" smtClean="0"/>
-              <a:t>7/11/2016</a:t>
+              <a:t>7/14/2016</a:t>
             </a:fld>
             <a:endParaRPr lang="en-US" dirty="0"/>
           </a:p>
@@ -3331,7 +3331,7 @@
             <a:fld id="{96DFF08F-DC6B-4601-B491-B0F83F6DD2DA}" type="datetimeFigureOut">
               <a:rPr lang="en-US" smtClean="0"/>
               <a:pPr/>
-              <a:t>7/11/2016</a:t>
+              <a:t>7/14/2016</a:t>
             </a:fld>
             <a:endParaRPr lang="en-US" dirty="0"/>
           </a:p>
@@ -4483,7 +4483,15 @@
             </a:r>
             <a:r>
               <a:rPr lang="de-DE" dirty="0"/>
-              <a:t> hole </a:t>
+              <a:t> </a:t>
+            </a:r>
+            <a:r>
+              <a:rPr lang="de-DE" dirty="0" err="1"/>
+              <a:t>whole</a:t>
+            </a:r>
+            <a:r>
+              <a:rPr lang="de-DE" dirty="0"/>
+              <a:t> </a:t>
             </a:r>
             <a:r>
               <a:rPr lang="de-DE" dirty="0" err="1"/>
@@ -4822,7 +4830,7 @@
           <a:effectLst/>
           <a:extLst>
             <a:ext uri="{91240B29-F687-4f45-9708-019B960494DF}">
-              <a14:hiddenLine xmlns:a14="http://schemas.microsoft.com/office/drawing/2010/main" xmlns="" w="9525">
+              <a14:hiddenLine xmlns="" xmlns:a14="http://schemas.microsoft.com/office/drawing/2010/main" w="9525">
                 <a:solidFill>
                   <a:schemeClr val="tx1"/>
                 </a:solidFill>
@@ -4832,7 +4840,7 @@
               </a14:hiddenLine>
             </a:ext>
             <a:ext uri="{AF507438-7753-43e0-B8FC-AC1667EBCBE1}">
-              <a14:hiddenEffects xmlns:a14="http://schemas.microsoft.com/office/drawing/2010/main" xmlns="">
+              <a14:hiddenEffects xmlns="" xmlns:a14="http://schemas.microsoft.com/office/drawing/2010/main">
                 <a:effectLst>
                   <a:outerShdw dist="35921" dir="2700000" algn="ctr" rotWithShape="0">
                     <a:schemeClr val="bg2"/>
@@ -6017,7 +6025,7 @@
           <a:effectLst/>
           <a:extLst>
             <a:ext uri="{91240B29-F687-4f45-9708-019B960494DF}">
-              <a14:hiddenLine xmlns:a14="http://schemas.microsoft.com/office/drawing/2010/main" xmlns="" w="9525">
+              <a14:hiddenLine xmlns="" xmlns:a14="http://schemas.microsoft.com/office/drawing/2010/main" w="9525">
                 <a:solidFill>
                   <a:schemeClr val="tx1"/>
                 </a:solidFill>
@@ -6027,7 +6035,7 @@
               </a14:hiddenLine>
             </a:ext>
             <a:ext uri="{AF507438-7753-43e0-B8FC-AC1667EBCBE1}">
-              <a14:hiddenEffects xmlns:a14="http://schemas.microsoft.com/office/drawing/2010/main" xmlns="">
+              <a14:hiddenEffects xmlns="" xmlns:a14="http://schemas.microsoft.com/office/drawing/2010/main">
                 <a:effectLst>
                   <a:outerShdw dist="35921" dir="2700000" algn="ctr" rotWithShape="0">
                     <a:schemeClr val="bg2"/>
@@ -9760,8 +9768,8 @@
           </a:fontRef>
         </p:style>
       </p:cxnSp>
-      <mc:AlternateContent xmlns:mc="http://schemas.openxmlformats.org/markup-compatibility/2006">
-        <mc:Choice xmlns:a14="http://schemas.microsoft.com/office/drawing/2010/main" Requires="a14">
+      <mc:AlternateContent xmlns:mc="http://schemas.openxmlformats.org/markup-compatibility/2006" xmlns:a14="http://schemas.microsoft.com/office/drawing/2010/main">
+        <mc:Choice Requires="a14">
           <p:sp>
             <p:nvSpPr>
               <p:cNvPr id="179" name="Rechteck 178"/>
@@ -9783,7 +9791,6 @@
               </a:bodyPr>
               <a:lstStyle/>
               <a:p>
-                <a:pPr/>
                 <a:r>
                   <a:rPr lang="de-DE" b="0" dirty="0"/>
                   <a:t>P(F)</a:t>
@@ -9857,13 +9864,7 @@
                               <a:rPr lang="de-DE" b="0" i="1" smtClean="0">
                                 <a:latin typeface="Cambria Math" panose="02040503050406030204" pitchFamily="18" charset="0"/>
                               </a:rPr>
-                              <m:t>)</m:t>
-                            </m:r>
-                            <m:r>
-                              <a:rPr lang="de-DE" b="0" i="1" smtClean="0">
-                                <a:latin typeface="Cambria Math" panose="02040503050406030204" pitchFamily="18" charset="0"/>
-                              </a:rPr>
-                              <m:t>+</m:t>
+                              <m:t>)+</m:t>
                             </m:r>
                             <m:r>
                               <a:rPr lang="de-DE" b="0" i="1" smtClean="0">
@@ -9887,13 +9888,7 @@
                               <a:rPr lang="de-DE" b="0" i="1" smtClean="0">
                                 <a:latin typeface="Cambria Math" panose="02040503050406030204" pitchFamily="18" charset="0"/>
                               </a:rPr>
-                              <m:t>)</m:t>
-                            </m:r>
-                            <m:r>
-                              <a:rPr lang="de-DE" b="0" i="1" smtClean="0">
-                                <a:latin typeface="Cambria Math" panose="02040503050406030204" pitchFamily="18" charset="0"/>
-                              </a:rPr>
-                              <m:t>⋅</m:t>
+                              <m:t>)⋅</m:t>
                             </m:r>
                             <m:d>
                               <m:dPr>
@@ -9945,13 +9940,7 @@
                                   <a:rPr lang="de-DE" b="0" i="1" smtClean="0">
                                     <a:latin typeface="Cambria Math" panose="02040503050406030204" pitchFamily="18" charset="0"/>
                                   </a:rPr>
-                                  <m:t>)</m:t>
-                                </m:r>
-                                <m:r>
-                                  <a:rPr lang="de-DE" b="0" i="1" smtClean="0">
-                                    <a:latin typeface="Cambria Math" panose="02040503050406030204" pitchFamily="18" charset="0"/>
-                                  </a:rPr>
-                                  <m:t>−</m:t>
+                                  <m:t>)−</m:t>
                                 </m:r>
                                 <m:r>
                                   <a:rPr lang="de-DE" b="0" i="1" smtClean="0">
@@ -10151,13 +10140,7 @@
                               <a:rPr lang="de-DE" b="0" i="1" smtClean="0">
                                 <a:latin typeface="Cambria Math" panose="02040503050406030204" pitchFamily="18" charset="0"/>
                               </a:rPr>
-                              <m:t>)</m:t>
-                            </m:r>
-                            <m:r>
-                              <a:rPr lang="de-DE" b="0" i="1" smtClean="0">
-                                <a:latin typeface="Cambria Math" panose="02040503050406030204" pitchFamily="18" charset="0"/>
-                              </a:rPr>
-                              <m:t>+</m:t>
+                              <m:t>)+</m:t>
                             </m:r>
                             <m:r>
                               <a:rPr lang="de-DE" b="0" i="1" smtClean="0">
@@ -10181,13 +10164,7 @@
                               <a:rPr lang="de-DE" b="0" i="1" smtClean="0">
                                 <a:latin typeface="Cambria Math" panose="02040503050406030204" pitchFamily="18" charset="0"/>
                               </a:rPr>
-                              <m:t>)</m:t>
-                            </m:r>
-                            <m:r>
-                              <a:rPr lang="de-DE" b="0" i="1" smtClean="0">
-                                <a:latin typeface="Cambria Math" panose="02040503050406030204" pitchFamily="18" charset="0"/>
-                              </a:rPr>
-                              <m:t>⋅</m:t>
+                              <m:t>)⋅</m:t>
                             </m:r>
                             <m:d>
                               <m:dPr>
@@ -10239,13 +10216,7 @@
                                   <a:rPr lang="de-DE" b="0" i="1" smtClean="0">
                                     <a:latin typeface="Cambria Math" panose="02040503050406030204" pitchFamily="18" charset="0"/>
                                   </a:rPr>
-                                  <m:t>)</m:t>
-                                </m:r>
-                                <m:r>
-                                  <a:rPr lang="de-DE" b="0" i="1" smtClean="0">
-                                    <a:latin typeface="Cambria Math" panose="02040503050406030204" pitchFamily="18" charset="0"/>
-                                  </a:rPr>
-                                  <m:t>−</m:t>
+                                  <m:t>)−</m:t>
                                 </m:r>
                                 <m:r>
                                   <a:rPr lang="de-DE" b="0" i="1" smtClean="0">
@@ -10308,19 +10279,7 @@
                               <a:rPr lang="de-DE" b="0" i="1" smtClean="0">
                                 <a:latin typeface="Cambria Math" panose="02040503050406030204" pitchFamily="18" charset="0"/>
                               </a:rPr>
-                              <m:t>       </m:t>
-                            </m:r>
-                            <m:r>
-                              <a:rPr lang="de-DE" b="0" i="1" smtClean="0">
-                                <a:latin typeface="Cambria Math" panose="02040503050406030204" pitchFamily="18" charset="0"/>
-                              </a:rPr>
-                              <m:t>            </m:t>
-                            </m:r>
-                            <m:r>
-                              <a:rPr lang="de-DE" b="0" i="1" smtClean="0">
-                                <a:latin typeface="Cambria Math" panose="02040503050406030204" pitchFamily="18" charset="0"/>
-                              </a:rPr>
-                              <m:t>                    </m:t>
+                              <m:t>                                       </m:t>
                             </m:r>
                           </m:e>
                         </m:eqArr>
@@ -10333,7 +10292,7 @@
             </p:txBody>
           </p:sp>
         </mc:Choice>
-        <mc:Fallback>
+        <mc:Fallback xmlns="">
           <p:sp>
             <p:nvSpPr>
               <p:cNvPr id="179" name="Rechteck 178"/>
@@ -10372,8 +10331,8 @@
           </p:sp>
         </mc:Fallback>
       </mc:AlternateContent>
-      <mc:AlternateContent xmlns:mc="http://schemas.openxmlformats.org/markup-compatibility/2006">
-        <mc:Choice xmlns:a14="http://schemas.microsoft.com/office/drawing/2010/main" Requires="a14">
+      <mc:AlternateContent xmlns:mc="http://schemas.openxmlformats.org/markup-compatibility/2006" xmlns:a14="http://schemas.microsoft.com/office/drawing/2010/main">
+        <mc:Choice Requires="a14">
           <p:sp>
             <p:nvSpPr>
               <p:cNvPr id="13" name="Textfeld 12"/>
@@ -10396,6 +10355,7 @@
               </a:bodyPr>
               <a:lstStyle/>
               <a:p>
+                <a:pPr/>
                 <a14:m>
                   <m:oMathPara xmlns:m="http://schemas.openxmlformats.org/officeDocument/2006/math">
                     <m:oMathParaPr>
@@ -10536,7 +10496,7 @@
             </p:txBody>
           </p:sp>
         </mc:Choice>
-        <mc:Fallback>
+        <mc:Fallback xmlns="">
           <p:sp>
             <p:nvSpPr>
               <p:cNvPr id="13" name="Textfeld 12"/>
@@ -10575,8 +10535,8 @@
           </p:sp>
         </mc:Fallback>
       </mc:AlternateContent>
-      <mc:AlternateContent xmlns:mc="http://schemas.openxmlformats.org/markup-compatibility/2006">
-        <mc:Choice xmlns:a14="http://schemas.microsoft.com/office/drawing/2010/main" Requires="a14">
+      <mc:AlternateContent xmlns:mc="http://schemas.openxmlformats.org/markup-compatibility/2006" xmlns:a14="http://schemas.microsoft.com/office/drawing/2010/main">
+        <mc:Choice Requires="a14">
           <p:sp>
             <p:nvSpPr>
               <p:cNvPr id="35" name="Textfeld 34"/>
@@ -10599,6 +10559,7 @@
               </a:bodyPr>
               <a:lstStyle/>
               <a:p>
+                <a:pPr/>
                 <a14:m>
                   <m:oMathPara xmlns:m="http://schemas.openxmlformats.org/officeDocument/2006/math">
                     <m:oMathParaPr>
@@ -10659,7 +10620,7 @@
             </p:txBody>
           </p:sp>
         </mc:Choice>
-        <mc:Fallback>
+        <mc:Fallback xmlns="">
           <p:sp>
             <p:nvSpPr>
               <p:cNvPr id="35" name="Textfeld 34"/>
@@ -10698,8 +10659,8 @@
           </p:sp>
         </mc:Fallback>
       </mc:AlternateContent>
-      <mc:AlternateContent xmlns:mc="http://schemas.openxmlformats.org/markup-compatibility/2006">
-        <mc:Choice xmlns:a14="http://schemas.microsoft.com/office/drawing/2010/main" Requires="a14">
+      <mc:AlternateContent xmlns:mc="http://schemas.openxmlformats.org/markup-compatibility/2006" xmlns:a14="http://schemas.microsoft.com/office/drawing/2010/main">
+        <mc:Choice Requires="a14">
           <p:sp>
             <p:nvSpPr>
               <p:cNvPr id="37" name="Textfeld 36"/>
@@ -10722,6 +10683,7 @@
               </a:bodyPr>
               <a:lstStyle/>
               <a:p>
+                <a:pPr/>
                 <a14:m>
                   <m:oMathPara xmlns:m="http://schemas.openxmlformats.org/officeDocument/2006/math">
                     <m:oMathParaPr>
@@ -10862,7 +10824,7 @@
             </p:txBody>
           </p:sp>
         </mc:Choice>
-        <mc:Fallback>
+        <mc:Fallback xmlns="">
           <p:sp>
             <p:nvSpPr>
               <p:cNvPr id="37" name="Textfeld 36"/>
@@ -12236,8 +12198,8 @@
           </a:fontRef>
         </p:style>
       </p:cxnSp>
-      <mc:AlternateContent xmlns:mc="http://schemas.openxmlformats.org/markup-compatibility/2006">
-        <mc:Choice xmlns:a14="http://schemas.microsoft.com/office/drawing/2010/main" Requires="a14">
+      <mc:AlternateContent xmlns:mc="http://schemas.openxmlformats.org/markup-compatibility/2006" xmlns:a14="http://schemas.microsoft.com/office/drawing/2010/main">
+        <mc:Choice Requires="a14">
           <p:sp>
             <p:nvSpPr>
               <p:cNvPr id="179" name="Rechteck 178"/>
@@ -12259,7 +12221,6 @@
               </a:bodyPr>
               <a:lstStyle/>
               <a:p>
-                <a:pPr/>
                 <a:r>
                   <a:rPr lang="de-DE" b="0" dirty="0"/>
                   <a:t>P(F)</a:t>
@@ -12333,13 +12294,7 @@
                               <a:rPr lang="de-DE" b="0" i="1" smtClean="0">
                                 <a:latin typeface="Cambria Math" panose="02040503050406030204" pitchFamily="18" charset="0"/>
                               </a:rPr>
-                              <m:t>)</m:t>
-                            </m:r>
-                            <m:r>
-                              <a:rPr lang="de-DE" b="0" i="1" smtClean="0">
-                                <a:latin typeface="Cambria Math" panose="02040503050406030204" pitchFamily="18" charset="0"/>
-                              </a:rPr>
-                              <m:t>+</m:t>
+                              <m:t>)+</m:t>
                             </m:r>
                             <m:r>
                               <a:rPr lang="de-DE" b="0" i="1" smtClean="0">
@@ -12363,13 +12318,7 @@
                               <a:rPr lang="de-DE" b="0" i="1" smtClean="0">
                                 <a:latin typeface="Cambria Math" panose="02040503050406030204" pitchFamily="18" charset="0"/>
                               </a:rPr>
-                              <m:t>)</m:t>
-                            </m:r>
-                            <m:r>
-                              <a:rPr lang="de-DE" b="0" i="1" smtClean="0">
-                                <a:latin typeface="Cambria Math" panose="02040503050406030204" pitchFamily="18" charset="0"/>
-                              </a:rPr>
-                              <m:t>⋅</m:t>
+                              <m:t>)⋅</m:t>
                             </m:r>
                             <m:d>
                               <m:dPr>
@@ -12421,13 +12370,7 @@
                                   <a:rPr lang="de-DE" b="0" i="1" smtClean="0">
                                     <a:latin typeface="Cambria Math" panose="02040503050406030204" pitchFamily="18" charset="0"/>
                                   </a:rPr>
-                                  <m:t>)</m:t>
-                                </m:r>
-                                <m:r>
-                                  <a:rPr lang="de-DE" b="0" i="1" smtClean="0">
-                                    <a:latin typeface="Cambria Math" panose="02040503050406030204" pitchFamily="18" charset="0"/>
-                                  </a:rPr>
-                                  <m:t>−</m:t>
+                                  <m:t>)−</m:t>
                                 </m:r>
                                 <m:r>
                                   <a:rPr lang="de-DE" b="0" i="1" smtClean="0">
@@ -12627,13 +12570,7 @@
                               <a:rPr lang="de-DE" b="0" i="1" smtClean="0">
                                 <a:latin typeface="Cambria Math" panose="02040503050406030204" pitchFamily="18" charset="0"/>
                               </a:rPr>
-                              <m:t>)</m:t>
-                            </m:r>
-                            <m:r>
-                              <a:rPr lang="de-DE" b="0" i="1" smtClean="0">
-                                <a:latin typeface="Cambria Math" panose="02040503050406030204" pitchFamily="18" charset="0"/>
-                              </a:rPr>
-                              <m:t>+</m:t>
+                              <m:t>)+</m:t>
                             </m:r>
                             <m:r>
                               <a:rPr lang="de-DE" b="0" i="1" smtClean="0">
@@ -12657,13 +12594,7 @@
                               <a:rPr lang="de-DE" b="0" i="1" smtClean="0">
                                 <a:latin typeface="Cambria Math" panose="02040503050406030204" pitchFamily="18" charset="0"/>
                               </a:rPr>
-                              <m:t>)</m:t>
-                            </m:r>
-                            <m:r>
-                              <a:rPr lang="de-DE" b="0" i="1" smtClean="0">
-                                <a:latin typeface="Cambria Math" panose="02040503050406030204" pitchFamily="18" charset="0"/>
-                              </a:rPr>
-                              <m:t>⋅</m:t>
+                              <m:t>)⋅</m:t>
                             </m:r>
                             <m:d>
                               <m:dPr>
@@ -12715,13 +12646,7 @@
                                   <a:rPr lang="de-DE" b="0" i="1" smtClean="0">
                                     <a:latin typeface="Cambria Math" panose="02040503050406030204" pitchFamily="18" charset="0"/>
                                   </a:rPr>
-                                  <m:t>)</m:t>
-                                </m:r>
-                                <m:r>
-                                  <a:rPr lang="de-DE" b="0" i="1" smtClean="0">
-                                    <a:latin typeface="Cambria Math" panose="02040503050406030204" pitchFamily="18" charset="0"/>
-                                  </a:rPr>
-                                  <m:t>−</m:t>
+                                  <m:t>)−</m:t>
                                 </m:r>
                                 <m:r>
                                   <a:rPr lang="de-DE" b="0" i="1" smtClean="0">
@@ -12784,19 +12709,7 @@
                               <a:rPr lang="de-DE" b="0" i="1" smtClean="0">
                                 <a:latin typeface="Cambria Math" panose="02040503050406030204" pitchFamily="18" charset="0"/>
                               </a:rPr>
-                              <m:t>       </m:t>
-                            </m:r>
-                            <m:r>
-                              <a:rPr lang="de-DE" b="0" i="1" smtClean="0">
-                                <a:latin typeface="Cambria Math" panose="02040503050406030204" pitchFamily="18" charset="0"/>
-                              </a:rPr>
-                              <m:t>            </m:t>
-                            </m:r>
-                            <m:r>
-                              <a:rPr lang="de-DE" b="0" i="1" smtClean="0">
-                                <a:latin typeface="Cambria Math" panose="02040503050406030204" pitchFamily="18" charset="0"/>
-                              </a:rPr>
-                              <m:t>                    </m:t>
+                              <m:t>                                       </m:t>
                             </m:r>
                           </m:e>
                         </m:eqArr>
@@ -12809,7 +12722,7 @@
             </p:txBody>
           </p:sp>
         </mc:Choice>
-        <mc:Fallback>
+        <mc:Fallback xmlns="">
           <p:sp>
             <p:nvSpPr>
               <p:cNvPr id="179" name="Rechteck 178"/>
@@ -12848,8 +12761,8 @@
           </p:sp>
         </mc:Fallback>
       </mc:AlternateContent>
-      <mc:AlternateContent xmlns:mc="http://schemas.openxmlformats.org/markup-compatibility/2006">
-        <mc:Choice xmlns:a14="http://schemas.microsoft.com/office/drawing/2010/main" Requires="a14">
+      <mc:AlternateContent xmlns:mc="http://schemas.openxmlformats.org/markup-compatibility/2006" xmlns:a14="http://schemas.microsoft.com/office/drawing/2010/main">
+        <mc:Choice Requires="a14">
           <p:sp>
             <p:nvSpPr>
               <p:cNvPr id="13" name="Textfeld 12"/>
@@ -12872,6 +12785,7 @@
               </a:bodyPr>
               <a:lstStyle/>
               <a:p>
+                <a:pPr/>
                 <a14:m>
                   <m:oMathPara xmlns:m="http://schemas.openxmlformats.org/officeDocument/2006/math">
                     <m:oMathParaPr>
@@ -12932,7 +12846,7 @@
             </p:txBody>
           </p:sp>
         </mc:Choice>
-        <mc:Fallback>
+        <mc:Fallback xmlns="">
           <p:sp>
             <p:nvSpPr>
               <p:cNvPr id="13" name="Textfeld 12"/>
@@ -12971,8 +12885,8 @@
           </p:sp>
         </mc:Fallback>
       </mc:AlternateContent>
-      <mc:AlternateContent xmlns:mc="http://schemas.openxmlformats.org/markup-compatibility/2006">
-        <mc:Choice xmlns:a14="http://schemas.microsoft.com/office/drawing/2010/main" Requires="a14">
+      <mc:AlternateContent xmlns:mc="http://schemas.openxmlformats.org/markup-compatibility/2006" xmlns:a14="http://schemas.microsoft.com/office/drawing/2010/main">
+        <mc:Choice Requires="a14">
           <p:sp>
             <p:nvSpPr>
               <p:cNvPr id="35" name="Textfeld 34"/>
@@ -12995,6 +12909,7 @@
               </a:bodyPr>
               <a:lstStyle/>
               <a:p>
+                <a:pPr/>
                 <a14:m>
                   <m:oMathPara xmlns:m="http://schemas.openxmlformats.org/officeDocument/2006/math">
                     <m:oMathParaPr>
@@ -13055,7 +12970,7 @@
             </p:txBody>
           </p:sp>
         </mc:Choice>
-        <mc:Fallback>
+        <mc:Fallback xmlns="">
           <p:sp>
             <p:nvSpPr>
               <p:cNvPr id="35" name="Textfeld 34"/>
@@ -13424,7 +13339,7 @@
             <a:graphicData uri="http://schemas.openxmlformats.org/presentationml/2006/ole">
               <mc:AlternateContent xmlns:mc="http://schemas.openxmlformats.org/markup-compatibility/2006">
                 <mc:Choice xmlns:v="urn:schemas-microsoft-com:vml" Requires="v">
-                  <p:oleObj spid="_x0000_s2136" name="Formel" r:id="rId3" imgW="609600" imgH="406400" progId="Equation.3">
+                  <p:oleObj spid="_x0000_s2142" name="Formel" r:id="rId3" imgW="609600" imgH="406400" progId="Equation.3">
                     <p:embed/>
                   </p:oleObj>
                 </mc:Choice>
@@ -13481,7 +13396,7 @@
             <a:graphicData uri="http://schemas.openxmlformats.org/presentationml/2006/ole">
               <mc:AlternateContent xmlns:mc="http://schemas.openxmlformats.org/markup-compatibility/2006">
                 <mc:Choice xmlns:v="urn:schemas-microsoft-com:vml" Requires="v">
-                  <p:oleObj spid="_x0000_s2137" name="Formel" r:id="rId5" imgW="469800" imgH="177480" progId="Equation.3">
+                  <p:oleObj spid="_x0000_s2143" name="Formel" r:id="rId5" imgW="469800" imgH="177480" progId="Equation.3">
                     <p:embed/>
                   </p:oleObj>
                 </mc:Choice>
@@ -13539,7 +13454,7 @@
           <a:graphicData uri="http://schemas.openxmlformats.org/presentationml/2006/ole">
             <mc:AlternateContent xmlns:mc="http://schemas.openxmlformats.org/markup-compatibility/2006">
               <mc:Choice xmlns:v="urn:schemas-microsoft-com:vml" Requires="v">
-                <p:oleObj spid="_x0000_s2138" name="Formel" r:id="rId7" imgW="1574800" imgH="457200" progId="Equation.3">
+                <p:oleObj spid="_x0000_s2144" name="Formel" r:id="rId7" imgW="1574800" imgH="457200" progId="Equation.3">
                   <p:embed/>
                 </p:oleObj>
               </mc:Choice>

</xml_diff>